<commit_message>
système de notification intelligente
</commit_message>
<xml_diff>
--- a/Système de Notification .pptx
+++ b/Système de Notification .pptx
@@ -304,7 +304,7 @@
           <a:p>
             <a:fld id="{E7AE0205-90D3-43C8-A94F-89FB86F10A0F}" type="datetimeFigureOut">
               <a:rPr lang="fr-FR" smtClean="0"/>
-              <a:t>17/03/2025</a:t>
+              <a:t>21/03/2025</a:t>
             </a:fld>
             <a:endParaRPr lang="fr-FR"/>
           </a:p>
@@ -474,7 +474,7 @@
           <a:p>
             <a:fld id="{E7AE0205-90D3-43C8-A94F-89FB86F10A0F}" type="datetimeFigureOut">
               <a:rPr lang="fr-FR" smtClean="0"/>
-              <a:t>17/03/2025</a:t>
+              <a:t>21/03/2025</a:t>
             </a:fld>
             <a:endParaRPr lang="fr-FR"/>
           </a:p>
@@ -654,7 +654,7 @@
           <a:p>
             <a:fld id="{E7AE0205-90D3-43C8-A94F-89FB86F10A0F}" type="datetimeFigureOut">
               <a:rPr lang="fr-FR" smtClean="0"/>
-              <a:t>17/03/2025</a:t>
+              <a:t>21/03/2025</a:t>
             </a:fld>
             <a:endParaRPr lang="fr-FR"/>
           </a:p>
@@ -824,7 +824,7 @@
           <a:p>
             <a:fld id="{E7AE0205-90D3-43C8-A94F-89FB86F10A0F}" type="datetimeFigureOut">
               <a:rPr lang="fr-FR" smtClean="0"/>
-              <a:t>17/03/2025</a:t>
+              <a:t>21/03/2025</a:t>
             </a:fld>
             <a:endParaRPr lang="fr-FR"/>
           </a:p>
@@ -1070,7 +1070,7 @@
           <a:p>
             <a:fld id="{E7AE0205-90D3-43C8-A94F-89FB86F10A0F}" type="datetimeFigureOut">
               <a:rPr lang="fr-FR" smtClean="0"/>
-              <a:t>17/03/2025</a:t>
+              <a:t>21/03/2025</a:t>
             </a:fld>
             <a:endParaRPr lang="fr-FR"/>
           </a:p>
@@ -1358,7 +1358,7 @@
           <a:p>
             <a:fld id="{E7AE0205-90D3-43C8-A94F-89FB86F10A0F}" type="datetimeFigureOut">
               <a:rPr lang="fr-FR" smtClean="0"/>
-              <a:t>17/03/2025</a:t>
+              <a:t>21/03/2025</a:t>
             </a:fld>
             <a:endParaRPr lang="fr-FR"/>
           </a:p>
@@ -1780,7 +1780,7 @@
           <a:p>
             <a:fld id="{E7AE0205-90D3-43C8-A94F-89FB86F10A0F}" type="datetimeFigureOut">
               <a:rPr lang="fr-FR" smtClean="0"/>
-              <a:t>17/03/2025</a:t>
+              <a:t>21/03/2025</a:t>
             </a:fld>
             <a:endParaRPr lang="fr-FR"/>
           </a:p>
@@ -1898,7 +1898,7 @@
           <a:p>
             <a:fld id="{E7AE0205-90D3-43C8-A94F-89FB86F10A0F}" type="datetimeFigureOut">
               <a:rPr lang="fr-FR" smtClean="0"/>
-              <a:t>17/03/2025</a:t>
+              <a:t>21/03/2025</a:t>
             </a:fld>
             <a:endParaRPr lang="fr-FR"/>
           </a:p>
@@ -1993,7 +1993,7 @@
           <a:p>
             <a:fld id="{E7AE0205-90D3-43C8-A94F-89FB86F10A0F}" type="datetimeFigureOut">
               <a:rPr lang="fr-FR" smtClean="0"/>
-              <a:t>17/03/2025</a:t>
+              <a:t>21/03/2025</a:t>
             </a:fld>
             <a:endParaRPr lang="fr-FR"/>
           </a:p>
@@ -2270,7 +2270,7 @@
           <a:p>
             <a:fld id="{E7AE0205-90D3-43C8-A94F-89FB86F10A0F}" type="datetimeFigureOut">
               <a:rPr lang="fr-FR" smtClean="0"/>
-              <a:t>17/03/2025</a:t>
+              <a:t>21/03/2025</a:t>
             </a:fld>
             <a:endParaRPr lang="fr-FR"/>
           </a:p>
@@ -2523,7 +2523,7 @@
           <a:p>
             <a:fld id="{E7AE0205-90D3-43C8-A94F-89FB86F10A0F}" type="datetimeFigureOut">
               <a:rPr lang="fr-FR" smtClean="0"/>
-              <a:t>17/03/2025</a:t>
+              <a:t>21/03/2025</a:t>
             </a:fld>
             <a:endParaRPr lang="fr-FR"/>
           </a:p>
@@ -2736,7 +2736,7 @@
           <a:p>
             <a:fld id="{E7AE0205-90D3-43C8-A94F-89FB86F10A0F}" type="datetimeFigureOut">
               <a:rPr lang="fr-FR" smtClean="0"/>
-              <a:t>17/03/2025</a:t>
+              <a:t>21/03/2025</a:t>
             </a:fld>
             <a:endParaRPr lang="fr-FR"/>
           </a:p>
@@ -3124,7 +3124,7 @@
         <p:spPr/>
         <p:txBody>
           <a:bodyPr>
-            <a:normAutofit/>
+            <a:normAutofit fontScale="90000"/>
           </a:bodyPr>
           <a:lstStyle/>
           <a:p>
@@ -3133,8 +3133,8 @@
               <a:t>Système de Notification - </a:t>
             </a:r>
             <a:r>
-              <a:rPr lang="fr-FR" dirty="0" err="1"/>
-              <a:t>Serviance</a:t>
+              <a:rPr lang="fr-FR" dirty="0" err="1" smtClean="0"/>
+              <a:t>Serviellance</a:t>
             </a:r>
             <a:endParaRPr lang="fr-FR" dirty="0"/>
           </a:p>

</xml_diff>